<commit_message>
Did a lot of Urtonburg stuff.
</commit_message>
<xml_diff>
--- a/The Jaws of Time.pptx
+++ b/The Jaws of Time.pptx
@@ -9,17 +9,11 @@
     <p:sldId id="260" r:id="rId3"/>
     <p:sldId id="306" r:id="rId4"/>
     <p:sldId id="316" r:id="rId5"/>
-    <p:sldId id="307" r:id="rId6"/>
-    <p:sldId id="308" r:id="rId7"/>
-    <p:sldId id="309" r:id="rId8"/>
-    <p:sldId id="310" r:id="rId9"/>
-    <p:sldId id="311" r:id="rId10"/>
-    <p:sldId id="312" r:id="rId11"/>
-    <p:sldId id="313" r:id="rId12"/>
-    <p:sldId id="314" r:id="rId13"/>
-    <p:sldId id="315" r:id="rId14"/>
-    <p:sldId id="317" r:id="rId15"/>
-    <p:sldId id="318" r:id="rId16"/>
+    <p:sldId id="319" r:id="rId6"/>
+    <p:sldId id="321" r:id="rId7"/>
+    <p:sldId id="307" r:id="rId8"/>
+    <p:sldId id="322" r:id="rId9"/>
+    <p:sldId id="320" r:id="rId10"/>
   </p:sldIdLst>
   <p:sldSz cx="7772400" cy="10058400"/>
   <p:notesSz cx="6858000" cy="9144000"/>
@@ -257,7 +251,7 @@
           <a:p>
             <a:fld id="{05FE7FBA-F4D8-4820-972B-6B84E9A3DAEA}" type="datetimeFigureOut">
               <a:rPr lang="en-US" smtClean="0"/>
-              <a:t>5/4/2021</a:t>
+              <a:t>5/5/2021</a:t>
             </a:fld>
             <a:endParaRPr lang="en-US"/>
           </a:p>
@@ -427,7 +421,7 @@
           <a:p>
             <a:fld id="{05FE7FBA-F4D8-4820-972B-6B84E9A3DAEA}" type="datetimeFigureOut">
               <a:rPr lang="en-US" smtClean="0"/>
-              <a:t>5/4/2021</a:t>
+              <a:t>5/5/2021</a:t>
             </a:fld>
             <a:endParaRPr lang="en-US"/>
           </a:p>
@@ -607,7 +601,7 @@
           <a:p>
             <a:fld id="{05FE7FBA-F4D8-4820-972B-6B84E9A3DAEA}" type="datetimeFigureOut">
               <a:rPr lang="en-US" smtClean="0"/>
-              <a:t>5/4/2021</a:t>
+              <a:t>5/5/2021</a:t>
             </a:fld>
             <a:endParaRPr lang="en-US"/>
           </a:p>
@@ -777,7 +771,7 @@
           <a:p>
             <a:fld id="{05FE7FBA-F4D8-4820-972B-6B84E9A3DAEA}" type="datetimeFigureOut">
               <a:rPr lang="en-US" smtClean="0"/>
-              <a:t>5/4/2021</a:t>
+              <a:t>5/5/2021</a:t>
             </a:fld>
             <a:endParaRPr lang="en-US"/>
           </a:p>
@@ -1021,7 +1015,7 @@
           <a:p>
             <a:fld id="{05FE7FBA-F4D8-4820-972B-6B84E9A3DAEA}" type="datetimeFigureOut">
               <a:rPr lang="en-US" smtClean="0"/>
-              <a:t>5/4/2021</a:t>
+              <a:t>5/5/2021</a:t>
             </a:fld>
             <a:endParaRPr lang="en-US"/>
           </a:p>
@@ -1253,7 +1247,7 @@
           <a:p>
             <a:fld id="{05FE7FBA-F4D8-4820-972B-6B84E9A3DAEA}" type="datetimeFigureOut">
               <a:rPr lang="en-US" smtClean="0"/>
-              <a:t>5/4/2021</a:t>
+              <a:t>5/5/2021</a:t>
             </a:fld>
             <a:endParaRPr lang="en-US"/>
           </a:p>
@@ -1620,7 +1614,7 @@
           <a:p>
             <a:fld id="{05FE7FBA-F4D8-4820-972B-6B84E9A3DAEA}" type="datetimeFigureOut">
               <a:rPr lang="en-US" smtClean="0"/>
-              <a:t>5/4/2021</a:t>
+              <a:t>5/5/2021</a:t>
             </a:fld>
             <a:endParaRPr lang="en-US"/>
           </a:p>
@@ -1738,7 +1732,7 @@
           <a:p>
             <a:fld id="{05FE7FBA-F4D8-4820-972B-6B84E9A3DAEA}" type="datetimeFigureOut">
               <a:rPr lang="en-US" smtClean="0"/>
-              <a:t>5/4/2021</a:t>
+              <a:t>5/5/2021</a:t>
             </a:fld>
             <a:endParaRPr lang="en-US"/>
           </a:p>
@@ -1833,7 +1827,7 @@
           <a:p>
             <a:fld id="{05FE7FBA-F4D8-4820-972B-6B84E9A3DAEA}" type="datetimeFigureOut">
               <a:rPr lang="en-US" smtClean="0"/>
-              <a:t>5/4/2021</a:t>
+              <a:t>5/5/2021</a:t>
             </a:fld>
             <a:endParaRPr lang="en-US"/>
           </a:p>
@@ -2110,7 +2104,7 @@
           <a:p>
             <a:fld id="{05FE7FBA-F4D8-4820-972B-6B84E9A3DAEA}" type="datetimeFigureOut">
               <a:rPr lang="en-US" smtClean="0"/>
-              <a:t>5/4/2021</a:t>
+              <a:t>5/5/2021</a:t>
             </a:fld>
             <a:endParaRPr lang="en-US"/>
           </a:p>
@@ -2281,7 +2275,6 @@
               <a:rPr lang="en-US"/>
               <a:t>Click icon to add picture</a:t>
             </a:r>
-            <a:endParaRPr lang="en-US" dirty="0"/>
           </a:p>
         </p:txBody>
       </p:sp>
@@ -2367,7 +2360,7 @@
           <a:p>
             <a:fld id="{05FE7FBA-F4D8-4820-972B-6B84E9A3DAEA}" type="datetimeFigureOut">
               <a:rPr lang="en-US" smtClean="0"/>
-              <a:t>5/4/2021</a:t>
+              <a:t>5/5/2021</a:t>
             </a:fld>
             <a:endParaRPr lang="en-US"/>
           </a:p>
@@ -2585,7 +2578,7 @@
           <a:p>
             <a:fld id="{05FE7FBA-F4D8-4820-972B-6B84E9A3DAEA}" type="datetimeFigureOut">
               <a:rPr lang="en-US" smtClean="0"/>
-              <a:t>5/4/2021</a:t>
+              <a:t>5/5/2021</a:t>
             </a:fld>
             <a:endParaRPr lang="en-US"/>
           </a:p>
@@ -3014,7 +3007,7 @@
           <a:lstStyle/>
           <a:p>
             <a:r>
-              <a:rPr lang="en-US" sz="7200" dirty="0">
+              <a:rPr lang="en-US" sz="7200">
                 <a:latin typeface="Blackadder ITC" panose="04020505051007020D02" pitchFamily="82" charset="0"/>
               </a:rPr>
               <a:t>The Jaws of Time</a:t>
@@ -3046,7 +3039,7 @@
           <a:lstStyle/>
           <a:p>
             <a:r>
-              <a:rPr lang="en-US" sz="3200" dirty="0">
+              <a:rPr lang="en-US" sz="3200">
                 <a:latin typeface="18thCentury" pitchFamily="2" charset="0"/>
               </a:rPr>
               <a:t>Garrett Stonis</a:t>
@@ -3058,813 +3051,6 @@
     <p:extLst>
       <p:ext uri="{BB962C8B-B14F-4D97-AF65-F5344CB8AC3E}">
         <p14:creationId xmlns:p14="http://schemas.microsoft.com/office/powerpoint/2010/main" val="3941557482"/>
-      </p:ext>
-    </p:extLst>
-  </p:cSld>
-  <p:clrMapOvr>
-    <a:masterClrMapping/>
-  </p:clrMapOvr>
-</p:sld>
-</file>
-
-<file path=ppt/slides/slide10.xml><?xml version="1.0" encoding="utf-8"?>
-<p:sld xmlns:a="http://schemas.openxmlformats.org/drawingml/2006/main" xmlns:r="http://schemas.openxmlformats.org/officeDocument/2006/relationships" xmlns:p="http://schemas.openxmlformats.org/presentationml/2006/main">
-  <p:cSld>
-    <p:spTree>
-      <p:nvGrpSpPr>
-        <p:cNvPr id="1" name=""/>
-        <p:cNvGrpSpPr/>
-        <p:nvPr/>
-      </p:nvGrpSpPr>
-      <p:grpSpPr>
-        <a:xfrm>
-          <a:off x="0" y="0"/>
-          <a:ext cx="0" cy="0"/>
-          <a:chOff x="0" y="0"/>
-          <a:chExt cx="0" cy="0"/>
-        </a:xfrm>
-      </p:grpSpPr>
-      <p:sp>
-        <p:nvSpPr>
-          <p:cNvPr id="2" name="Title 1">
-            <a:extLst>
-              <a:ext uri="{FF2B5EF4-FFF2-40B4-BE49-F238E27FC236}">
-                <a16:creationId xmlns:a16="http://schemas.microsoft.com/office/drawing/2014/main" id="{9B674860-A09C-456D-AF24-E3D7DE6D080A}"/>
-              </a:ext>
-            </a:extLst>
-          </p:cNvPr>
-          <p:cNvSpPr>
-            <a:spLocks noGrp="1"/>
-          </p:cNvSpPr>
-          <p:nvPr>
-            <p:ph type="title"/>
-          </p:nvPr>
-        </p:nvSpPr>
-        <p:spPr/>
-        <p:txBody>
-          <a:bodyPr>
-            <a:normAutofit/>
-          </a:bodyPr>
-          <a:lstStyle/>
-          <a:p>
-            <a:r>
-              <a:rPr lang="en-US" sz="4400" dirty="0">
-                <a:latin typeface="Papyrus" panose="03070502060502030205" pitchFamily="66" charset="0"/>
-              </a:rPr>
-              <a:t>The Titans (cont.)</a:t>
-            </a:r>
-          </a:p>
-        </p:txBody>
-      </p:sp>
-      <p:sp>
-        <p:nvSpPr>
-          <p:cNvPr id="3" name="Content Placeholder 2">
-            <a:extLst>
-              <a:ext uri="{FF2B5EF4-FFF2-40B4-BE49-F238E27FC236}">
-                <a16:creationId xmlns:a16="http://schemas.microsoft.com/office/drawing/2014/main" id="{F059A770-66B2-4E0F-AD2D-7CF7229B5782}"/>
-              </a:ext>
-            </a:extLst>
-          </p:cNvPr>
-          <p:cNvSpPr>
-            <a:spLocks noGrp="1"/>
-          </p:cNvSpPr>
-          <p:nvPr>
-            <p:ph idx="1"/>
-          </p:nvPr>
-        </p:nvSpPr>
-        <p:spPr/>
-        <p:txBody>
-          <a:bodyPr>
-            <a:normAutofit/>
-          </a:bodyPr>
-          <a:lstStyle/>
-          <a:p>
-            <a:pPr marL="0" indent="0">
-              <a:lnSpc>
-                <a:spcPct val="150000"/>
-              </a:lnSpc>
-              <a:buNone/>
-            </a:pPr>
-            <a:r>
-              <a:rPr lang="en-US" sz="1400" b="1" i="1" dirty="0">
-                <a:latin typeface="Arial" panose="020B0604020202020204" pitchFamily="34" charset="0"/>
-                <a:cs typeface="Arial" panose="020B0604020202020204" pitchFamily="34" charset="0"/>
-              </a:rPr>
-              <a:t>Origin of Consciousness:</a:t>
-            </a:r>
-          </a:p>
-          <a:p>
-            <a:pPr marL="0" indent="457200">
-              <a:lnSpc>
-                <a:spcPct val="150000"/>
-              </a:lnSpc>
-              <a:buNone/>
-            </a:pPr>
-            <a:r>
-              <a:rPr lang="en-US" sz="1400" dirty="0">
-                <a:latin typeface="Arial" panose="020B0604020202020204" pitchFamily="34" charset="0"/>
-                <a:cs typeface="Arial" panose="020B0604020202020204" pitchFamily="34" charset="0"/>
-              </a:rPr>
-              <a:t>At first all titans were unconscious and performed their respective jobs tirelessly. This was also before any of them used any of their special devices to manipulate the universe more effectively; they just slaved away, much like the Four Brothers still do. Consciousness was accidentally discovered when each aspect of each titan combined. For a being to be conscious, it must be comprised of matter (The Four Brothers), be organized into some regular structure (Ordo), be able to use free will (Perditio), have a concept of time (Chronos), and have a little magic (Mystra) to glue everything together. Each of the titans first shared the same consciousness (called the Master Brain), then decided to split off into separate beings when the universe needed more focus in separate areas. The Four Brothers decided that their job was too dangerous (and boring) to reasonably sustain consciousness, and so they gave it up.</a:t>
-            </a:r>
-          </a:p>
-        </p:txBody>
-      </p:sp>
-    </p:spTree>
-    <p:extLst>
-      <p:ext uri="{BB962C8B-B14F-4D97-AF65-F5344CB8AC3E}">
-        <p14:creationId xmlns:p14="http://schemas.microsoft.com/office/powerpoint/2010/main" val="3490920296"/>
-      </p:ext>
-    </p:extLst>
-  </p:cSld>
-  <p:clrMapOvr>
-    <a:masterClrMapping/>
-  </p:clrMapOvr>
-</p:sld>
-</file>
-
-<file path=ppt/slides/slide11.xml><?xml version="1.0" encoding="utf-8"?>
-<p:sld xmlns:a="http://schemas.openxmlformats.org/drawingml/2006/main" xmlns:r="http://schemas.openxmlformats.org/officeDocument/2006/relationships" xmlns:p="http://schemas.openxmlformats.org/presentationml/2006/main">
-  <p:cSld>
-    <p:spTree>
-      <p:nvGrpSpPr>
-        <p:cNvPr id="1" name=""/>
-        <p:cNvGrpSpPr/>
-        <p:nvPr/>
-      </p:nvGrpSpPr>
-      <p:grpSpPr>
-        <a:xfrm>
-          <a:off x="0" y="0"/>
-          <a:ext cx="0" cy="0"/>
-          <a:chOff x="0" y="0"/>
-          <a:chExt cx="0" cy="0"/>
-        </a:xfrm>
-      </p:grpSpPr>
-      <p:sp>
-        <p:nvSpPr>
-          <p:cNvPr id="2" name="Title 1">
-            <a:extLst>
-              <a:ext uri="{FF2B5EF4-FFF2-40B4-BE49-F238E27FC236}">
-                <a16:creationId xmlns:a16="http://schemas.microsoft.com/office/drawing/2014/main" id="{9B674860-A09C-456D-AF24-E3D7DE6D080A}"/>
-              </a:ext>
-            </a:extLst>
-          </p:cNvPr>
-          <p:cNvSpPr>
-            <a:spLocks noGrp="1"/>
-          </p:cNvSpPr>
-          <p:nvPr>
-            <p:ph type="title"/>
-          </p:nvPr>
-        </p:nvSpPr>
-        <p:spPr/>
-        <p:txBody>
-          <a:bodyPr>
-            <a:normAutofit/>
-          </a:bodyPr>
-          <a:lstStyle/>
-          <a:p>
-            <a:r>
-              <a:rPr lang="en-US" sz="4400" dirty="0">
-                <a:latin typeface="Papyrus" panose="03070502060502030205" pitchFamily="66" charset="0"/>
-              </a:rPr>
-              <a:t>The Gods</a:t>
-            </a:r>
-          </a:p>
-        </p:txBody>
-      </p:sp>
-      <p:sp>
-        <p:nvSpPr>
-          <p:cNvPr id="3" name="Content Placeholder 2">
-            <a:extLst>
-              <a:ext uri="{FF2B5EF4-FFF2-40B4-BE49-F238E27FC236}">
-                <a16:creationId xmlns:a16="http://schemas.microsoft.com/office/drawing/2014/main" id="{F059A770-66B2-4E0F-AD2D-7CF7229B5782}"/>
-              </a:ext>
-            </a:extLst>
-          </p:cNvPr>
-          <p:cNvSpPr>
-            <a:spLocks noGrp="1"/>
-          </p:cNvSpPr>
-          <p:nvPr>
-            <p:ph idx="1"/>
-          </p:nvPr>
-        </p:nvSpPr>
-        <p:spPr/>
-        <p:txBody>
-          <a:bodyPr>
-            <a:normAutofit/>
-          </a:bodyPr>
-          <a:lstStyle/>
-          <a:p>
-            <a:pPr marL="0" indent="0">
-              <a:lnSpc>
-                <a:spcPct val="150000"/>
-              </a:lnSpc>
-              <a:buNone/>
-            </a:pPr>
-            <a:r>
-              <a:rPr lang="en-US" sz="1400" b="1" i="1" dirty="0">
-                <a:latin typeface="Arial" panose="020B0604020202020204" pitchFamily="34" charset="0"/>
-                <a:cs typeface="Arial" panose="020B0604020202020204" pitchFamily="34" charset="0"/>
-              </a:rPr>
-              <a:t>Before the Gods:</a:t>
-            </a:r>
-          </a:p>
-          <a:p>
-            <a:pPr marL="0" indent="457200">
-              <a:lnSpc>
-                <a:spcPct val="150000"/>
-              </a:lnSpc>
-              <a:buNone/>
-            </a:pPr>
-            <a:r>
-              <a:rPr lang="en-US" sz="1400" dirty="0">
-                <a:latin typeface="Arial" panose="020B0604020202020204" pitchFamily="34" charset="0"/>
-                <a:cs typeface="Arial" panose="020B0604020202020204" pitchFamily="34" charset="0"/>
-              </a:rPr>
-              <a:t>When the Master Brain was split so each titan got their own consciousness, the Four Brothers decided not to take it. The half of the brain that they would have had was instead split into many beings, known to mortals as the Aboleths.</a:t>
-            </a:r>
-          </a:p>
-          <a:p>
-            <a:pPr marL="0" indent="457200">
-              <a:lnSpc>
-                <a:spcPct val="150000"/>
-              </a:lnSpc>
-              <a:buNone/>
-            </a:pPr>
-            <a:endParaRPr lang="en-US" sz="1400" dirty="0">
-              <a:latin typeface="Arial" panose="020B0604020202020204" pitchFamily="34" charset="0"/>
-              <a:cs typeface="Arial" panose="020B0604020202020204" pitchFamily="34" charset="0"/>
-            </a:endParaRPr>
-          </a:p>
-          <a:p>
-            <a:pPr marL="0" indent="0">
-              <a:lnSpc>
-                <a:spcPct val="150000"/>
-              </a:lnSpc>
-              <a:buNone/>
-            </a:pPr>
-            <a:r>
-              <a:rPr lang="en-US" sz="1400" b="1" i="1" dirty="0">
-                <a:latin typeface="Arial" panose="020B0604020202020204" pitchFamily="34" charset="0"/>
-                <a:cs typeface="Arial" panose="020B0604020202020204" pitchFamily="34" charset="0"/>
-              </a:rPr>
-              <a:t>Primordius – The First God:</a:t>
-            </a:r>
-          </a:p>
-          <a:p>
-            <a:pPr marL="0" indent="457200">
-              <a:lnSpc>
-                <a:spcPct val="150000"/>
-              </a:lnSpc>
-              <a:buNone/>
-            </a:pPr>
-            <a:r>
-              <a:rPr lang="en-US" sz="1400" dirty="0">
-                <a:latin typeface="Arial" panose="020B0604020202020204" pitchFamily="34" charset="0"/>
-                <a:cs typeface="Arial" panose="020B0604020202020204" pitchFamily="34" charset="0"/>
-              </a:rPr>
-              <a:t>Primordius was the titans’ first attempt to create something other than what was programmed for them. He was more of an experiment; made without purpose in mind apart from “can we make something living?” The answer was yes. So, what did Primordius do with his newfound life? He created language, Primordial to be specific. (Primordius was rather vain.) Primordius used his new language abilities to communicate to the titans in an entirely new way. Due to his lack of work (and excess of boredom), he thought of many ways the universe could be improved by making more gods. His suggestion fell on deaf ears at first, but caught the attention of Perditio, due to the potential chaos that can come from it. Perditio knows the titans more than Primordius and was able to convince them that gods can help enforce the rules they have in place, and that it can be fun (she is very convincing).</a:t>
-            </a:r>
-          </a:p>
-        </p:txBody>
-      </p:sp>
-    </p:spTree>
-    <p:extLst>
-      <p:ext uri="{BB962C8B-B14F-4D97-AF65-F5344CB8AC3E}">
-        <p14:creationId xmlns:p14="http://schemas.microsoft.com/office/powerpoint/2010/main" val="1390735285"/>
-      </p:ext>
-    </p:extLst>
-  </p:cSld>
-  <p:clrMapOvr>
-    <a:masterClrMapping/>
-  </p:clrMapOvr>
-</p:sld>
-</file>
-
-<file path=ppt/slides/slide12.xml><?xml version="1.0" encoding="utf-8"?>
-<p:sld xmlns:a="http://schemas.openxmlformats.org/drawingml/2006/main" xmlns:r="http://schemas.openxmlformats.org/officeDocument/2006/relationships" xmlns:p="http://schemas.openxmlformats.org/presentationml/2006/main">
-  <p:cSld>
-    <p:spTree>
-      <p:nvGrpSpPr>
-        <p:cNvPr id="1" name=""/>
-        <p:cNvGrpSpPr/>
-        <p:nvPr/>
-      </p:nvGrpSpPr>
-      <p:grpSpPr>
-        <a:xfrm>
-          <a:off x="0" y="0"/>
-          <a:ext cx="0" cy="0"/>
-          <a:chOff x="0" y="0"/>
-          <a:chExt cx="0" cy="0"/>
-        </a:xfrm>
-      </p:grpSpPr>
-      <p:sp>
-        <p:nvSpPr>
-          <p:cNvPr id="2" name="Title 1">
-            <a:extLst>
-              <a:ext uri="{FF2B5EF4-FFF2-40B4-BE49-F238E27FC236}">
-                <a16:creationId xmlns:a16="http://schemas.microsoft.com/office/drawing/2014/main" id="{9B674860-A09C-456D-AF24-E3D7DE6D080A}"/>
-              </a:ext>
-            </a:extLst>
-          </p:cNvPr>
-          <p:cNvSpPr>
-            <a:spLocks noGrp="1"/>
-          </p:cNvSpPr>
-          <p:nvPr>
-            <p:ph type="title"/>
-          </p:nvPr>
-        </p:nvSpPr>
-        <p:spPr/>
-        <p:txBody>
-          <a:bodyPr>
-            <a:normAutofit/>
-          </a:bodyPr>
-          <a:lstStyle/>
-          <a:p>
-            <a:r>
-              <a:rPr lang="en-US" sz="4400" dirty="0">
-                <a:latin typeface="Papyrus" panose="03070502060502030205" pitchFamily="66" charset="0"/>
-              </a:rPr>
-              <a:t>The Gods (cont.)</a:t>
-            </a:r>
-          </a:p>
-        </p:txBody>
-      </p:sp>
-      <p:sp>
-        <p:nvSpPr>
-          <p:cNvPr id="3" name="Content Placeholder 2">
-            <a:extLst>
-              <a:ext uri="{FF2B5EF4-FFF2-40B4-BE49-F238E27FC236}">
-                <a16:creationId xmlns:a16="http://schemas.microsoft.com/office/drawing/2014/main" id="{F059A770-66B2-4E0F-AD2D-7CF7229B5782}"/>
-              </a:ext>
-            </a:extLst>
-          </p:cNvPr>
-          <p:cNvSpPr>
-            <a:spLocks noGrp="1"/>
-          </p:cNvSpPr>
-          <p:nvPr>
-            <p:ph idx="1"/>
-          </p:nvPr>
-        </p:nvSpPr>
-        <p:spPr/>
-        <p:txBody>
-          <a:bodyPr>
-            <a:normAutofit/>
-          </a:bodyPr>
-          <a:lstStyle/>
-          <a:p>
-            <a:pPr marL="0" indent="0">
-              <a:lnSpc>
-                <a:spcPct val="150000"/>
-              </a:lnSpc>
-              <a:buNone/>
-            </a:pPr>
-            <a:r>
-              <a:rPr lang="en-US" sz="1400" b="1" i="1" dirty="0">
-                <a:latin typeface="Arial" panose="020B0604020202020204" pitchFamily="34" charset="0"/>
-                <a:cs typeface="Arial" panose="020B0604020202020204" pitchFamily="34" charset="0"/>
-              </a:rPr>
-              <a:t>Blah blah blah:</a:t>
-            </a:r>
-          </a:p>
-          <a:p>
-            <a:pPr marL="0" indent="457200">
-              <a:lnSpc>
-                <a:spcPct val="150000"/>
-              </a:lnSpc>
-              <a:buNone/>
-            </a:pPr>
-            <a:r>
-              <a:rPr lang="en-US" sz="1400" dirty="0">
-                <a:latin typeface="Arial" panose="020B0604020202020204" pitchFamily="34" charset="0"/>
-                <a:cs typeface="Arial" panose="020B0604020202020204" pitchFamily="34" charset="0"/>
-              </a:rPr>
-              <a:t>When the Master Brain was split so each titan got their own consciousness, the Four Brothers decided not to take it. The half of the brain that they would have had was instead split into many beings, known to mortals as the Aboleths.</a:t>
-            </a:r>
-          </a:p>
-        </p:txBody>
-      </p:sp>
-    </p:spTree>
-    <p:extLst>
-      <p:ext uri="{BB962C8B-B14F-4D97-AF65-F5344CB8AC3E}">
-        <p14:creationId xmlns:p14="http://schemas.microsoft.com/office/powerpoint/2010/main" val="1696594565"/>
-      </p:ext>
-    </p:extLst>
-  </p:cSld>
-  <p:clrMapOvr>
-    <a:masterClrMapping/>
-  </p:clrMapOvr>
-</p:sld>
-</file>
-
-<file path=ppt/slides/slide13.xml><?xml version="1.0" encoding="utf-8"?>
-<p:sld xmlns:a="http://schemas.openxmlformats.org/drawingml/2006/main" xmlns:r="http://schemas.openxmlformats.org/officeDocument/2006/relationships" xmlns:p="http://schemas.openxmlformats.org/presentationml/2006/main">
-  <p:cSld>
-    <p:spTree>
-      <p:nvGrpSpPr>
-        <p:cNvPr id="1" name=""/>
-        <p:cNvGrpSpPr/>
-        <p:nvPr/>
-      </p:nvGrpSpPr>
-      <p:grpSpPr>
-        <a:xfrm>
-          <a:off x="0" y="0"/>
-          <a:ext cx="0" cy="0"/>
-          <a:chOff x="0" y="0"/>
-          <a:chExt cx="0" cy="0"/>
-        </a:xfrm>
-      </p:grpSpPr>
-      <p:sp>
-        <p:nvSpPr>
-          <p:cNvPr id="2" name="Title 1">
-            <a:extLst>
-              <a:ext uri="{FF2B5EF4-FFF2-40B4-BE49-F238E27FC236}">
-                <a16:creationId xmlns:a16="http://schemas.microsoft.com/office/drawing/2014/main" id="{9B674860-A09C-456D-AF24-E3D7DE6D080A}"/>
-              </a:ext>
-            </a:extLst>
-          </p:cNvPr>
-          <p:cNvSpPr>
-            <a:spLocks noGrp="1"/>
-          </p:cNvSpPr>
-          <p:nvPr>
-            <p:ph type="title"/>
-          </p:nvPr>
-        </p:nvSpPr>
-        <p:spPr/>
-        <p:txBody>
-          <a:bodyPr>
-            <a:normAutofit/>
-          </a:bodyPr>
-          <a:lstStyle/>
-          <a:p>
-            <a:r>
-              <a:rPr lang="en-US" sz="4400" dirty="0">
-                <a:latin typeface="Papyrus" panose="03070502060502030205" pitchFamily="66" charset="0"/>
-              </a:rPr>
-              <a:t>The Multiverse</a:t>
-            </a:r>
-          </a:p>
-        </p:txBody>
-      </p:sp>
-      <p:sp>
-        <p:nvSpPr>
-          <p:cNvPr id="3" name="Content Placeholder 2">
-            <a:extLst>
-              <a:ext uri="{FF2B5EF4-FFF2-40B4-BE49-F238E27FC236}">
-                <a16:creationId xmlns:a16="http://schemas.microsoft.com/office/drawing/2014/main" id="{F059A770-66B2-4E0F-AD2D-7CF7229B5782}"/>
-              </a:ext>
-            </a:extLst>
-          </p:cNvPr>
-          <p:cNvSpPr>
-            <a:spLocks noGrp="1"/>
-          </p:cNvSpPr>
-          <p:nvPr>
-            <p:ph idx="1"/>
-          </p:nvPr>
-        </p:nvSpPr>
-        <p:spPr/>
-        <p:txBody>
-          <a:bodyPr>
-            <a:normAutofit/>
-          </a:bodyPr>
-          <a:lstStyle/>
-          <a:p>
-            <a:pPr marL="0" indent="0">
-              <a:lnSpc>
-                <a:spcPct val="150000"/>
-              </a:lnSpc>
-              <a:buNone/>
-            </a:pPr>
-            <a:r>
-              <a:rPr lang="en-US" sz="1400" b="1" i="1" dirty="0">
-                <a:latin typeface="Arial" panose="020B0604020202020204" pitchFamily="34" charset="0"/>
-                <a:cs typeface="Arial" panose="020B0604020202020204" pitchFamily="34" charset="0"/>
-              </a:rPr>
-              <a:t>Overview:</a:t>
-            </a:r>
-          </a:p>
-          <a:p>
-            <a:pPr marL="0" indent="457200">
-              <a:lnSpc>
-                <a:spcPct val="150000"/>
-              </a:lnSpc>
-              <a:buNone/>
-            </a:pPr>
-            <a:r>
-              <a:rPr lang="en-US" sz="1400" dirty="0">
-                <a:latin typeface="Arial" panose="020B0604020202020204" pitchFamily="34" charset="0"/>
-                <a:cs typeface="Arial" panose="020B0604020202020204" pitchFamily="34" charset="0"/>
-              </a:rPr>
-              <a:t>The basics of the multiverse is very similar to the regular Forgotten Realms system, but some removed planes, and added others. The Astral/Ethereal Plane are very mechanically similar to Forgotten Realms, but the lore behind it is very different. This may be the case for the rest of the realms too, especially everything non-Material. Each plane will get its own section, but this section will explain details that pertain to every plane, or plane clusters.</a:t>
-            </a:r>
-          </a:p>
-          <a:p>
-            <a:pPr marL="0" indent="457200">
-              <a:lnSpc>
-                <a:spcPct val="150000"/>
-              </a:lnSpc>
-              <a:buNone/>
-            </a:pPr>
-            <a:endParaRPr lang="en-US" sz="1400" dirty="0">
-              <a:latin typeface="Arial" panose="020B0604020202020204" pitchFamily="34" charset="0"/>
-              <a:cs typeface="Arial" panose="020B0604020202020204" pitchFamily="34" charset="0"/>
-            </a:endParaRPr>
-          </a:p>
-          <a:p>
-            <a:pPr marL="0" indent="0">
-              <a:lnSpc>
-                <a:spcPct val="150000"/>
-              </a:lnSpc>
-              <a:buNone/>
-            </a:pPr>
-            <a:r>
-              <a:rPr lang="en-US" sz="1400" b="1" i="1" dirty="0">
-                <a:latin typeface="Arial" panose="020B0604020202020204" pitchFamily="34" charset="0"/>
-                <a:cs typeface="Arial" panose="020B0604020202020204" pitchFamily="34" charset="0"/>
-              </a:rPr>
-              <a:t>Inter-Planar Travel:</a:t>
-            </a:r>
-          </a:p>
-          <a:p>
-            <a:pPr marL="0" indent="457200">
-              <a:lnSpc>
-                <a:spcPct val="150000"/>
-              </a:lnSpc>
-              <a:buNone/>
-            </a:pPr>
-            <a:r>
-              <a:rPr lang="en-US" sz="1400" dirty="0">
-                <a:latin typeface="Arial" panose="020B0604020202020204" pitchFamily="34" charset="0"/>
-                <a:cs typeface="Arial" panose="020B0604020202020204" pitchFamily="34" charset="0"/>
-              </a:rPr>
-              <a:t>The standard 5e methods of travel apply to the Inner Circle. This includes portals (temporary openings to other planes), gates (permanent openings to other planes), and direct connection (planes are physically attached to one another). As for the Outer Cloud, only portals and gates are possible as none of these planes are physically connected to any other plane. Portals are opened for a short time and can go unnoticed in the sending and receiving plane if planned correctly. Gates are impossible to permanently close and are often known by higher beings, and therefore guarded. Some require special conditions to be met, but most simply need to be walked through. Every plane, no matter how big or small is gated to the</a:t>
-            </a:r>
-          </a:p>
-        </p:txBody>
-      </p:sp>
-    </p:spTree>
-    <p:extLst>
-      <p:ext uri="{BB962C8B-B14F-4D97-AF65-F5344CB8AC3E}">
-        <p14:creationId xmlns:p14="http://schemas.microsoft.com/office/powerpoint/2010/main" val="3198511897"/>
-      </p:ext>
-    </p:extLst>
-  </p:cSld>
-  <p:clrMapOvr>
-    <a:masterClrMapping/>
-  </p:clrMapOvr>
-</p:sld>
-</file>
-
-<file path=ppt/slides/slide14.xml><?xml version="1.0" encoding="utf-8"?>
-<p:sld xmlns:a="http://schemas.openxmlformats.org/drawingml/2006/main" xmlns:r="http://schemas.openxmlformats.org/officeDocument/2006/relationships" xmlns:p="http://schemas.openxmlformats.org/presentationml/2006/main">
-  <p:cSld>
-    <p:spTree>
-      <p:nvGrpSpPr>
-        <p:cNvPr id="1" name=""/>
-        <p:cNvGrpSpPr/>
-        <p:nvPr/>
-      </p:nvGrpSpPr>
-      <p:grpSpPr>
-        <a:xfrm>
-          <a:off x="0" y="0"/>
-          <a:ext cx="0" cy="0"/>
-          <a:chOff x="0" y="0"/>
-          <a:chExt cx="0" cy="0"/>
-        </a:xfrm>
-      </p:grpSpPr>
-      <p:sp>
-        <p:nvSpPr>
-          <p:cNvPr id="2" name="Title 1">
-            <a:extLst>
-              <a:ext uri="{FF2B5EF4-FFF2-40B4-BE49-F238E27FC236}">
-                <a16:creationId xmlns:a16="http://schemas.microsoft.com/office/drawing/2014/main" id="{9B674860-A09C-456D-AF24-E3D7DE6D080A}"/>
-              </a:ext>
-            </a:extLst>
-          </p:cNvPr>
-          <p:cNvSpPr>
-            <a:spLocks noGrp="1"/>
-          </p:cNvSpPr>
-          <p:nvPr>
-            <p:ph type="title"/>
-          </p:nvPr>
-        </p:nvSpPr>
-        <p:spPr/>
-        <p:txBody>
-          <a:bodyPr>
-            <a:normAutofit/>
-          </a:bodyPr>
-          <a:lstStyle/>
-          <a:p>
-            <a:r>
-              <a:rPr lang="en-US" sz="4400" dirty="0">
-                <a:latin typeface="Papyrus" panose="03070502060502030205" pitchFamily="66" charset="0"/>
-              </a:rPr>
-              <a:t>The Multiverse (cont.)</a:t>
-            </a:r>
-          </a:p>
-        </p:txBody>
-      </p:sp>
-      <p:sp>
-        <p:nvSpPr>
-          <p:cNvPr id="3" name="Content Placeholder 2">
-            <a:extLst>
-              <a:ext uri="{FF2B5EF4-FFF2-40B4-BE49-F238E27FC236}">
-                <a16:creationId xmlns:a16="http://schemas.microsoft.com/office/drawing/2014/main" id="{F059A770-66B2-4E0F-AD2D-7CF7229B5782}"/>
-              </a:ext>
-            </a:extLst>
-          </p:cNvPr>
-          <p:cNvSpPr>
-            <a:spLocks noGrp="1"/>
-          </p:cNvSpPr>
-          <p:nvPr>
-            <p:ph idx="1"/>
-          </p:nvPr>
-        </p:nvSpPr>
-        <p:spPr/>
-        <p:txBody>
-          <a:bodyPr>
-            <a:normAutofit/>
-          </a:bodyPr>
-          <a:lstStyle/>
-          <a:p>
-            <a:pPr marL="0" indent="0">
-              <a:lnSpc>
-                <a:spcPct val="150000"/>
-              </a:lnSpc>
-              <a:buNone/>
-            </a:pPr>
-            <a:r>
-              <a:rPr lang="en-US" sz="1400" dirty="0">
-                <a:latin typeface="Arial" panose="020B0604020202020204" pitchFamily="34" charset="0"/>
-                <a:cs typeface="Arial" panose="020B0604020202020204" pitchFamily="34" charset="0"/>
-              </a:rPr>
-              <a:t>Astral Plane, with the gates opening and closing as the plane does. This goes for demiplanes as well, meaning that any pocket of space could technically be gated to if you could somehow manage to find the single gate that leads there in the near infinite Astral Plane.</a:t>
-            </a:r>
-          </a:p>
-          <a:p>
-            <a:pPr marL="0" indent="457200">
-              <a:lnSpc>
-                <a:spcPct val="150000"/>
-              </a:lnSpc>
-              <a:buNone/>
-            </a:pPr>
-            <a:endParaRPr lang="en-US" sz="1400" dirty="0">
-              <a:latin typeface="Arial" panose="020B0604020202020204" pitchFamily="34" charset="0"/>
-              <a:cs typeface="Arial" panose="020B0604020202020204" pitchFamily="34" charset="0"/>
-            </a:endParaRPr>
-          </a:p>
-          <a:p>
-            <a:pPr marL="0" indent="0">
-              <a:lnSpc>
-                <a:spcPct val="150000"/>
-              </a:lnSpc>
-              <a:buNone/>
-            </a:pPr>
-            <a:r>
-              <a:rPr lang="en-US" sz="1400" b="1" i="1" dirty="0">
-                <a:latin typeface="Arial" panose="020B0604020202020204" pitchFamily="34" charset="0"/>
-                <a:cs typeface="Arial" panose="020B0604020202020204" pitchFamily="34" charset="0"/>
-              </a:rPr>
-              <a:t>Inner Circle:</a:t>
-            </a:r>
-          </a:p>
-          <a:p>
-            <a:pPr marL="0" indent="457200">
-              <a:lnSpc>
-                <a:spcPct val="150000"/>
-              </a:lnSpc>
-              <a:buNone/>
-            </a:pPr>
-            <a:r>
-              <a:rPr lang="en-US" sz="1400" dirty="0">
-                <a:latin typeface="Arial" panose="020B0604020202020204" pitchFamily="34" charset="0"/>
-                <a:cs typeface="Arial" panose="020B0604020202020204" pitchFamily="34" charset="0"/>
-              </a:rPr>
-              <a:t>The Inner Circle is made up of all the planes in the original multiverse, the Material Plane, the Feywild, the Shadowfell, and the Elemental Plane of Air/Earth/Fire/Water (and their in-betweens). The inner-most part of the Inner Circle (the Material Plane, Feywild, and Shadowfell (M.F.S. for short)) are mirror-planes. This means that these three planes share the exact same geography and even many of the same features, such as a castle or city. The elemental planes are different in the way that they are all physically connected. This is unique in the multiverse. Due to physical connection, the connecting points of two elemental planes create a set of mini-planes that merge their qualities.</a:t>
-            </a:r>
-          </a:p>
-        </p:txBody>
-      </p:sp>
-    </p:spTree>
-    <p:extLst>
-      <p:ext uri="{BB962C8B-B14F-4D97-AF65-F5344CB8AC3E}">
-        <p14:creationId xmlns:p14="http://schemas.microsoft.com/office/powerpoint/2010/main" val="4135799429"/>
-      </p:ext>
-    </p:extLst>
-  </p:cSld>
-  <p:clrMapOvr>
-    <a:masterClrMapping/>
-  </p:clrMapOvr>
-</p:sld>
-</file>
-
-<file path=ppt/slides/slide15.xml><?xml version="1.0" encoding="utf-8"?>
-<p:sld xmlns:a="http://schemas.openxmlformats.org/drawingml/2006/main" xmlns:r="http://schemas.openxmlformats.org/officeDocument/2006/relationships" xmlns:p="http://schemas.openxmlformats.org/presentationml/2006/main">
-  <p:cSld>
-    <p:spTree>
-      <p:nvGrpSpPr>
-        <p:cNvPr id="1" name=""/>
-        <p:cNvGrpSpPr/>
-        <p:nvPr/>
-      </p:nvGrpSpPr>
-      <p:grpSpPr>
-        <a:xfrm>
-          <a:off x="0" y="0"/>
-          <a:ext cx="0" cy="0"/>
-          <a:chOff x="0" y="0"/>
-          <a:chExt cx="0" cy="0"/>
-        </a:xfrm>
-      </p:grpSpPr>
-      <p:sp>
-        <p:nvSpPr>
-          <p:cNvPr id="2" name="Title 1">
-            <a:extLst>
-              <a:ext uri="{FF2B5EF4-FFF2-40B4-BE49-F238E27FC236}">
-                <a16:creationId xmlns:a16="http://schemas.microsoft.com/office/drawing/2014/main" id="{9B674860-A09C-456D-AF24-E3D7DE6D080A}"/>
-              </a:ext>
-            </a:extLst>
-          </p:cNvPr>
-          <p:cNvSpPr>
-            <a:spLocks noGrp="1"/>
-          </p:cNvSpPr>
-          <p:nvPr>
-            <p:ph type="title"/>
-          </p:nvPr>
-        </p:nvSpPr>
-        <p:spPr/>
-        <p:txBody>
-          <a:bodyPr>
-            <a:normAutofit/>
-          </a:bodyPr>
-          <a:lstStyle/>
-          <a:p>
-            <a:r>
-              <a:rPr lang="en-US" sz="4400" dirty="0">
-                <a:latin typeface="Papyrus" panose="03070502060502030205" pitchFamily="66" charset="0"/>
-              </a:rPr>
-              <a:t>The Multiverse (cont.)</a:t>
-            </a:r>
-          </a:p>
-        </p:txBody>
-      </p:sp>
-      <p:sp>
-        <p:nvSpPr>
-          <p:cNvPr id="3" name="Content Placeholder 2">
-            <a:extLst>
-              <a:ext uri="{FF2B5EF4-FFF2-40B4-BE49-F238E27FC236}">
-                <a16:creationId xmlns:a16="http://schemas.microsoft.com/office/drawing/2014/main" id="{F059A770-66B2-4E0F-AD2D-7CF7229B5782}"/>
-              </a:ext>
-            </a:extLst>
-          </p:cNvPr>
-          <p:cNvSpPr>
-            <a:spLocks noGrp="1"/>
-          </p:cNvSpPr>
-          <p:nvPr>
-            <p:ph idx="1"/>
-          </p:nvPr>
-        </p:nvSpPr>
-        <p:spPr/>
-        <p:txBody>
-          <a:bodyPr>
-            <a:normAutofit/>
-          </a:bodyPr>
-          <a:lstStyle/>
-          <a:p>
-            <a:pPr marL="0" indent="0">
-              <a:lnSpc>
-                <a:spcPct val="150000"/>
-              </a:lnSpc>
-              <a:buNone/>
-            </a:pPr>
-            <a:r>
-              <a:rPr lang="en-US" sz="1400" b="1" i="1" dirty="0">
-                <a:latin typeface="Arial" panose="020B0604020202020204" pitchFamily="34" charset="0"/>
-                <a:cs typeface="Arial" panose="020B0604020202020204" pitchFamily="34" charset="0"/>
-              </a:rPr>
-              <a:t>Outer Cloud:</a:t>
-            </a:r>
-          </a:p>
-          <a:p>
-            <a:pPr marL="0" indent="457200">
-              <a:lnSpc>
-                <a:spcPct val="150000"/>
-              </a:lnSpc>
-              <a:buNone/>
-            </a:pPr>
-            <a:r>
-              <a:rPr lang="en-US" sz="1400" dirty="0">
-                <a:latin typeface="Arial" panose="020B0604020202020204" pitchFamily="34" charset="0"/>
-                <a:cs typeface="Arial" panose="020B0604020202020204" pitchFamily="34" charset="0"/>
-              </a:rPr>
-              <a:t>The Outer Cloud is made up of every other plane/demi-plane in the entire multiverse. The only difference between a plane and a demi-plane here is how much work and care was put into its creation and maintenance. Many of the more important planes in the Outer Cloud are connected by the River Styx or the Infinite Staircase. Both act mechanically the same as Forgotten Realms but are changed in the planes they permeate. The River Styx goes through the Nine Hells, Hades, the Abyss, the entrance of Carceri, Mechanus, Elysium, Mount Celestia, Arcadia, and Ysgard (looping back to the Nine Hells). The Infinite Staircase goes through the same planes, but in reverse order. All the major planes in the Outer Cloud are the Nine Hells, Hades, the Abyss, the entrance of Carceri, Mechanus, Elysium, Mount Celestia, Arcadia, Ysgard, and Limbo. Limbo is too unstable to sustain either the River Styx or the Infinite Staircase.</a:t>
-            </a:r>
-          </a:p>
-        </p:txBody>
-      </p:sp>
-    </p:spTree>
-    <p:extLst>
-      <p:ext uri="{BB962C8B-B14F-4D97-AF65-F5344CB8AC3E}">
-        <p14:creationId xmlns:p14="http://schemas.microsoft.com/office/powerpoint/2010/main" val="2108741651"/>
       </p:ext>
     </p:extLst>
   </p:cSld>
@@ -3915,7 +3101,7 @@
           <a:lstStyle/>
           <a:p>
             <a:r>
-              <a:rPr lang="en-US" sz="4400" dirty="0">
+              <a:rPr lang="en-US" sz="4400">
                 <a:latin typeface="Papyrus" panose="03070502060502030205" pitchFamily="66" charset="0"/>
               </a:rPr>
               <a:t>Table of Contents:</a:t>
@@ -3945,7 +3131,7 @@
           <a:lstStyle/>
           <a:p>
             <a:r>
-              <a:rPr lang="en-US" dirty="0">
+              <a:rPr lang="en-US">
                 <a:latin typeface="18thCentury" pitchFamily="2" charset="0"/>
               </a:rPr>
               <a:t>Overview of the Universe</a:t>
@@ -3953,7 +3139,7 @@
           </a:p>
           <a:p>
             <a:r>
-              <a:rPr lang="en-US" dirty="0">
+              <a:rPr lang="en-US">
                 <a:latin typeface="18thCentury" pitchFamily="2" charset="0"/>
               </a:rPr>
               <a:t>Demigods, Gods, Titans, and the Creator</a:t>
@@ -3961,7 +3147,7 @@
           </a:p>
           <a:p>
             <a:r>
-              <a:rPr lang="en-US" dirty="0">
+              <a:rPr lang="en-US">
                 <a:latin typeface="18thCentury" pitchFamily="2" charset="0"/>
               </a:rPr>
               <a:t>16-32: Story Beats</a:t>
@@ -3970,7 +3156,7 @@
           <a:p>
             <a:pPr lvl="1"/>
             <a:r>
-              <a:rPr lang="en-US" sz="2380" dirty="0">
+              <a:rPr lang="en-US" sz="2380">
                 <a:latin typeface="18thCentury" pitchFamily="2" charset="0"/>
               </a:rPr>
               <a:t>19-28: Random Encounters</a:t>
@@ -3978,7 +3164,7 @@
           </a:p>
           <a:p>
             <a:r>
-              <a:rPr lang="en-US" dirty="0">
+              <a:rPr lang="en-US">
                 <a:latin typeface="18thCentury" pitchFamily="2" charset="0"/>
               </a:rPr>
               <a:t>34-40: Possible Endings</a:t>
@@ -4040,7 +3226,7 @@
           <a:lstStyle/>
           <a:p>
             <a:r>
-              <a:rPr lang="en-US" sz="4400" dirty="0">
+              <a:rPr lang="en-US" sz="4400">
                 <a:latin typeface="Papyrus" panose="03070502060502030205" pitchFamily="66" charset="0"/>
               </a:rPr>
               <a:t>Basic Introduction</a:t>
@@ -4078,7 +3264,7 @@
               <a:buNone/>
             </a:pPr>
             <a:r>
-              <a:rPr lang="en-US" sz="1400" dirty="0">
+              <a:rPr lang="en-US" sz="1400">
                 <a:latin typeface="Arial" panose="020B0604020202020204" pitchFamily="34" charset="0"/>
                 <a:cs typeface="Arial" panose="020B0604020202020204" pitchFamily="34" charset="0"/>
               </a:rPr>
@@ -4139,18 +3325,12 @@
           <a:lstStyle/>
           <a:p>
             <a:r>
-              <a:rPr lang="en-US" sz="5400" dirty="0">
+              <a:rPr lang="en-US" sz="5400">
                 <a:latin typeface="Papyrus" panose="03070502060502030205" pitchFamily="66" charset="0"/>
               </a:rPr>
-              <a:t>The Big </a:t>
-            </a:r>
-            <a:r>
-              <a:rPr lang="en-US" sz="5400" dirty="0" err="1">
-                <a:latin typeface="Papyrus" panose="03070502060502030205" pitchFamily="66" charset="0"/>
-              </a:rPr>
-              <a:t>Bois</a:t>
-            </a:r>
-            <a:endParaRPr lang="en-US" dirty="0"/>
+              <a:t>Places</a:t>
+            </a:r>
+            <a:endParaRPr lang="en-US"/>
           </a:p>
         </p:txBody>
       </p:sp>
@@ -4176,11 +3356,11 @@
           <a:lstStyle/>
           <a:p>
             <a:r>
-              <a:rPr lang="en-US" dirty="0">
+              <a:rPr lang="en-US">
                 <a:latin typeface="Arial" panose="020B0604020202020204" pitchFamily="34" charset="0"/>
                 <a:cs typeface="Arial" panose="020B0604020202020204" pitchFamily="34" charset="0"/>
               </a:rPr>
-              <a:t>Titans, Gods, and the like.</a:t>
+              <a:t>Urtonburg, Northwood, and more.</a:t>
             </a:r>
           </a:p>
         </p:txBody>
@@ -4239,10 +3419,10 @@
           <a:lstStyle/>
           <a:p>
             <a:r>
-              <a:rPr lang="en-US" sz="4400" dirty="0">
+              <a:rPr lang="en-US" sz="4400">
                 <a:latin typeface="Papyrus" panose="03070502060502030205" pitchFamily="66" charset="0"/>
               </a:rPr>
-              <a:t>The Hierarchy</a:t>
+              <a:t>Yultaria</a:t>
             </a:r>
           </a:p>
         </p:txBody>
@@ -4281,63 +3461,107 @@
                 <a:latin typeface="Arial" panose="020B0604020202020204" pitchFamily="34" charset="0"/>
                 <a:cs typeface="Arial" panose="020B0604020202020204" pitchFamily="34" charset="0"/>
               </a:rPr>
-              <a:t>This universe is a land of fantasy with some science to boost it, and so inherently the Gods are real tangible beings that are known and understood. So, what are they exactly? In this universe, the “Gods” are split into 4 categories: </a:t>
-            </a:r>
-            <a:r>
-              <a:rPr lang="en-US" sz="1400" b="1" i="1" dirty="0">
+              <a:t>The richest and largest country on Stromea, Yultaria is one of the trade capitals of the world. Boasting an impressive navy, Yultaria is ruled by only one kingdom, under </a:t>
+            </a:r>
+            <a:r>
+              <a:rPr lang="en-US" sz="1400" b="1" dirty="0">
                 <a:latin typeface="Arial" panose="020B0604020202020204" pitchFamily="34" charset="0"/>
                 <a:cs typeface="Arial" panose="020B0604020202020204" pitchFamily="34" charset="0"/>
               </a:rPr>
-              <a:t>Demigods</a:t>
+              <a:t>King Rupert</a:t>
             </a:r>
             <a:r>
               <a:rPr lang="en-US" sz="1400" dirty="0">
                 <a:latin typeface="Arial" panose="020B0604020202020204" pitchFamily="34" charset="0"/>
                 <a:cs typeface="Arial" panose="020B0604020202020204" pitchFamily="34" charset="0"/>
               </a:rPr>
-              <a:t>, </a:t>
-            </a:r>
-            <a:r>
-              <a:rPr lang="en-US" sz="1400" b="1" i="1" dirty="0">
-                <a:latin typeface="Arial" panose="020B0604020202020204" pitchFamily="34" charset="0"/>
-                <a:cs typeface="Arial" panose="020B0604020202020204" pitchFamily="34" charset="0"/>
-              </a:rPr>
-              <a:t>Gods</a:t>
-            </a:r>
+              <a:t>. King Rupert is more of a militaristic leader, despite Yultaria not being at war for many decades.</a:t>
+            </a:r>
+          </a:p>
+          <a:p>
+            <a:pPr marL="0" indent="463550">
+              <a:lnSpc>
+                <a:spcPct val="150000"/>
+              </a:lnSpc>
+              <a:buNone/>
+            </a:pPr>
             <a:r>
               <a:rPr lang="en-US" sz="1400" dirty="0">
                 <a:latin typeface="Arial" panose="020B0604020202020204" pitchFamily="34" charset="0"/>
                 <a:cs typeface="Arial" panose="020B0604020202020204" pitchFamily="34" charset="0"/>
               </a:rPr>
-              <a:t>, </a:t>
-            </a:r>
-            <a:r>
-              <a:rPr lang="en-US" sz="1400" b="1" i="1" dirty="0">
+              <a:t>Yultaria is rich in forest and minerals, exporting lumber, iron, coal, precious metals, and more. Yultaria is also home to the largest steel company in the world, </a:t>
+            </a:r>
+            <a:r>
+              <a:rPr lang="en-US" sz="1400" b="1" dirty="0">
                 <a:latin typeface="Arial" panose="020B0604020202020204" pitchFamily="34" charset="0"/>
                 <a:cs typeface="Arial" panose="020B0604020202020204" pitchFamily="34" charset="0"/>
               </a:rPr>
-              <a:t>Titans</a:t>
+              <a:t>Orebraid Steel</a:t>
             </a:r>
             <a:r>
               <a:rPr lang="en-US" sz="1400" dirty="0">
                 <a:latin typeface="Arial" panose="020B0604020202020204" pitchFamily="34" charset="0"/>
                 <a:cs typeface="Arial" panose="020B0604020202020204" pitchFamily="34" charset="0"/>
               </a:rPr>
-              <a:t>, and </a:t>
-            </a:r>
-            <a:r>
-              <a:rPr lang="en-US" sz="1400" b="1" i="1" dirty="0">
+              <a:t>. Due to the near monopoly of Orebraid, finding another source of steel can be rather difficult, and trying to start your own business can be risky as Orebraid’s men are very likely to sabotage. </a:t>
+            </a:r>
+            <a:r>
+              <a:rPr lang="en-US" sz="1400" b="1" dirty="0">
                 <a:latin typeface="Arial" panose="020B0604020202020204" pitchFamily="34" charset="0"/>
                 <a:cs typeface="Arial" panose="020B0604020202020204" pitchFamily="34" charset="0"/>
               </a:rPr>
-              <a:t>The Creator</a:t>
+              <a:t>Norman Orebraid</a:t>
             </a:r>
             <a:r>
               <a:rPr lang="en-US" sz="1400" dirty="0">
                 <a:latin typeface="Arial" panose="020B0604020202020204" pitchFamily="34" charset="0"/>
                 <a:cs typeface="Arial" panose="020B0604020202020204" pitchFamily="34" charset="0"/>
               </a:rPr>
-              <a:t>. Each category is several orders of magnitude more powerful than the last. Let’s break them down 1-by-1 in descending order.</a:t>
+              <a:t>, the current owner, is a ruthless businessman, owning every mine on the Southeast coast. The capital of the steel world is near these mines in the </a:t>
+            </a:r>
+            <a:r>
+              <a:rPr lang="en-US" sz="1400" b="1" dirty="0">
+                <a:latin typeface="Arial" panose="020B0604020202020204" pitchFamily="34" charset="0"/>
+                <a:cs typeface="Arial" panose="020B0604020202020204" pitchFamily="34" charset="0"/>
+              </a:rPr>
+              <a:t>Eastgough Peaks</a:t>
+            </a:r>
+            <a:r>
+              <a:rPr lang="en-US" sz="1400" dirty="0">
+                <a:latin typeface="Arial" panose="020B0604020202020204" pitchFamily="34" charset="0"/>
+                <a:cs typeface="Arial" panose="020B0604020202020204" pitchFamily="34" charset="0"/>
+              </a:rPr>
+              <a:t>, a city called </a:t>
+            </a:r>
+            <a:r>
+              <a:rPr lang="en-US" sz="1400" b="1" dirty="0">
+                <a:latin typeface="Arial" panose="020B0604020202020204" pitchFamily="34" charset="0"/>
+                <a:cs typeface="Arial" panose="020B0604020202020204" pitchFamily="34" charset="0"/>
+              </a:rPr>
+              <a:t>Dhordarum</a:t>
+            </a:r>
+            <a:r>
+              <a:rPr lang="en-US" sz="1400" dirty="0">
+                <a:latin typeface="Arial" panose="020B0604020202020204" pitchFamily="34" charset="0"/>
+                <a:cs typeface="Arial" panose="020B0604020202020204" pitchFamily="34" charset="0"/>
+              </a:rPr>
+              <a:t>.</a:t>
+            </a:r>
+          </a:p>
+          <a:p>
+            <a:pPr marL="0" indent="463550">
+              <a:lnSpc>
+                <a:spcPct val="150000"/>
+              </a:lnSpc>
+              <a:buNone/>
+            </a:pPr>
+            <a:r>
+              <a:rPr lang="en-US" sz="1400" dirty="0">
+                <a:latin typeface="Arial" panose="020B0604020202020204" pitchFamily="34" charset="0"/>
+                <a:cs typeface="Arial" panose="020B0604020202020204" pitchFamily="34" charset="0"/>
+              </a:rPr>
+              <a:t>Most of Yultaria is covered in forest and grasslands, with marshlands at the very south and mountains to the southeast. The northern-most parts of Yultaria are snowy taiga forests.</a:t>
             </a:r>
           </a:p>
         </p:txBody>
@@ -4345,7 +3569,7 @@
     </p:spTree>
     <p:extLst>
       <p:ext uri="{BB962C8B-B14F-4D97-AF65-F5344CB8AC3E}">
-        <p14:creationId xmlns:p14="http://schemas.microsoft.com/office/powerpoint/2010/main" val="4636803"/>
+        <p14:creationId xmlns:p14="http://schemas.microsoft.com/office/powerpoint/2010/main" val="1933702008"/>
       </p:ext>
     </p:extLst>
   </p:cSld>
@@ -4399,84 +3623,50 @@
               <a:rPr lang="en-US" sz="4400" dirty="0">
                 <a:latin typeface="Papyrus" panose="03070502060502030205" pitchFamily="66" charset="0"/>
               </a:rPr>
-              <a:t>The Creator</a:t>
-            </a:r>
-          </a:p>
-        </p:txBody>
-      </p:sp>
-      <p:sp>
-        <p:nvSpPr>
-          <p:cNvPr id="3" name="Content Placeholder 2">
+              <a:t>Urtonburg</a:t>
+            </a:r>
+          </a:p>
+        </p:txBody>
+      </p:sp>
+      <p:pic>
+        <p:nvPicPr>
+          <p:cNvPr id="5" name="Content Placeholder 4" descr="A picture containing map&#10;&#10;Description automatically generated">
             <a:extLst>
               <a:ext uri="{FF2B5EF4-FFF2-40B4-BE49-F238E27FC236}">
-                <a16:creationId xmlns:a16="http://schemas.microsoft.com/office/drawing/2014/main" id="{F059A770-66B2-4E0F-AD2D-7CF7229B5782}"/>
+                <a16:creationId xmlns:a16="http://schemas.microsoft.com/office/drawing/2014/main" id="{C5282E8A-E267-4C5D-909D-4749FE0CD02C}"/>
               </a:ext>
             </a:extLst>
           </p:cNvPr>
-          <p:cNvSpPr>
-            <a:spLocks noGrp="1"/>
-          </p:cNvSpPr>
+          <p:cNvPicPr>
+            <a:picLocks noGrp="1" noChangeAspect="1"/>
+          </p:cNvPicPr>
           <p:nvPr>
             <p:ph idx="1"/>
           </p:nvPr>
-        </p:nvSpPr>
-        <p:spPr/>
-        <p:txBody>
-          <a:bodyPr>
-            <a:normAutofit/>
-          </a:bodyPr>
-          <a:lstStyle/>
-          <a:p>
-            <a:pPr marL="0" indent="463550">
-              <a:lnSpc>
-                <a:spcPct val="150000"/>
-              </a:lnSpc>
-              <a:buNone/>
-            </a:pPr>
-            <a:r>
-              <a:rPr lang="en-US" sz="1400" dirty="0">
-                <a:latin typeface="Arial" panose="020B0604020202020204" pitchFamily="34" charset="0"/>
-                <a:cs typeface="Arial" panose="020B0604020202020204" pitchFamily="34" charset="0"/>
-              </a:rPr>
-              <a:t>The end all/be all of creation. The Creator is responsible for the creation of the Titans, and by proxy the entire universe. Not much is known about Them, but all true information is hidden in the minds of the titans, all of which have little interest actually passing this information along. What is known is that They are gone and no longer have direct influence over the universe. Philosophers theorize possible explanations for Their disappearance and being, but it is impossible to determine which of these theories are truly correct.</a:t>
-            </a:r>
-          </a:p>
-          <a:p>
-            <a:pPr marL="0" indent="463550">
-              <a:lnSpc>
-                <a:spcPct val="150000"/>
-              </a:lnSpc>
-              <a:buNone/>
-            </a:pPr>
-            <a:r>
-              <a:rPr lang="en-US" sz="1400" dirty="0">
-                <a:latin typeface="Arial" panose="020B0604020202020204" pitchFamily="34" charset="0"/>
-                <a:cs typeface="Arial" panose="020B0604020202020204" pitchFamily="34" charset="0"/>
-              </a:rPr>
-              <a:t>In the beginning, the Creator created the titans, Their tools for giving birth to the universe. They gave each Titan the power to manipulate a certain aspect of reality, instructing each one where to use this power. After this moment, They have since been absent for all time. Speaking of time, it is run by the Titan Chronos, so technically this moment could have taken anywhere between literally no time at time, to infinite time. We will never know.</a:t>
-            </a:r>
-          </a:p>
-          <a:p>
-            <a:pPr marL="0" indent="463550">
-              <a:lnSpc>
-                <a:spcPct val="150000"/>
-              </a:lnSpc>
-              <a:buNone/>
-            </a:pPr>
-            <a:r>
-              <a:rPr lang="en-US" sz="1400" dirty="0">
-                <a:latin typeface="Arial" panose="020B0604020202020204" pitchFamily="34" charset="0"/>
-                <a:cs typeface="Arial" panose="020B0604020202020204" pitchFamily="34" charset="0"/>
-              </a:rPr>
-              <a:t>The only races truly concerned with the Creator directly are the inhabitants of the Astral Plane and Far Realms, likely due to the proximity of these areas and the Creator’s possible wishes.</a:t>
-            </a:r>
-          </a:p>
-        </p:txBody>
-      </p:sp>
+        </p:nvPicPr>
+        <p:blipFill>
+          <a:blip r:embed="rId2">
+            <a:extLst>
+              <a:ext uri="{28A0092B-C50C-407E-A947-70E740481C1C}">
+                <a14:useLocalDpi xmlns:a14="http://schemas.microsoft.com/office/drawing/2010/main" val="0"/>
+              </a:ext>
+            </a:extLst>
+          </a:blip>
+          <a:stretch>
+            <a:fillRect/>
+          </a:stretch>
+        </p:blipFill>
+        <p:spPr>
+          <a:xfrm>
+            <a:off x="534988" y="2723114"/>
+            <a:ext cx="6702425" cy="6291748"/>
+          </a:xfrm>
+        </p:spPr>
+      </p:pic>
     </p:spTree>
     <p:extLst>
       <p:ext uri="{BB962C8B-B14F-4D97-AF65-F5344CB8AC3E}">
-        <p14:creationId xmlns:p14="http://schemas.microsoft.com/office/powerpoint/2010/main" val="1960992982"/>
+        <p14:creationId xmlns:p14="http://schemas.microsoft.com/office/powerpoint/2010/main" val="2150025898"/>
       </p:ext>
     </p:extLst>
   </p:cSld>
@@ -4530,7 +3720,7 @@
               <a:rPr lang="en-US" sz="4400" dirty="0">
                 <a:latin typeface="Papyrus" panose="03070502060502030205" pitchFamily="66" charset="0"/>
               </a:rPr>
-              <a:t>The Titans</a:t>
+              <a:t>Urtonburg (cont.)</a:t>
             </a:r>
           </a:p>
         </p:txBody>
@@ -4569,7 +3759,7 @@
                 <a:latin typeface="Arial" panose="020B0604020202020204" pitchFamily="34" charset="0"/>
                 <a:cs typeface="Arial" panose="020B0604020202020204" pitchFamily="34" charset="0"/>
               </a:rPr>
-              <a:t>The Titans are the tools used by the Creator to form the laws of physics in the universe. Some titans are responsible for maintaining the creation/destruction (recycling) of matter, while others form the basis of universal concepts like magic or time. Each of the titans’ alignments are true neutral, and they have very little care for any beings other than themselves due to their business. Some of the titans are even unaligned, as they lack consciousness.</a:t>
+              <a:t>The old capital of Yultaria, Urtonburg is the most populated city at nearly 10,000 citizens. If you include traders and travelers, then the population easily surpasses 10k. The population is roughly split at 15% human, 30% elf (and half elf), 35% dwarf, 10% halfling, 5% half orc, and 5% various other races. Most of the races stick to their respective districts but will very commonly meet in the Trade District.</a:t>
             </a:r>
           </a:p>
           <a:p>
@@ -4579,24 +3769,12 @@
               </a:lnSpc>
               <a:buNone/>
             </a:pPr>
-            <a:endParaRPr lang="en-US" sz="1400" dirty="0">
-              <a:latin typeface="Arial" panose="020B0604020202020204" pitchFamily="34" charset="0"/>
-              <a:cs typeface="Arial" panose="020B0604020202020204" pitchFamily="34" charset="0"/>
-            </a:endParaRPr>
-          </a:p>
-          <a:p>
-            <a:pPr marL="0" indent="0">
-              <a:lnSpc>
-                <a:spcPct val="150000"/>
-              </a:lnSpc>
-              <a:buNone/>
-            </a:pPr>
-            <a:r>
-              <a:rPr lang="en-US" sz="1400" b="1" i="1" dirty="0">
+            <a:r>
+              <a:rPr lang="en-US" sz="1400" dirty="0">
                 <a:latin typeface="Arial" panose="020B0604020202020204" pitchFamily="34" charset="0"/>
                 <a:cs typeface="Arial" panose="020B0604020202020204" pitchFamily="34" charset="0"/>
               </a:rPr>
-              <a:t>The Four Brothers:</a:t>
+              <a:t>While most of the population is dwarf, the city is actually run almost entirely by humans. Urtonburg is run by a committee of 10 nobles that are appointed directly by King Rupert. The only elf and dwarf on the committee are Mythanar Philynn and Goteam Chainmace, respectively. Mythanar was appointed due to his brilliance in the arcane arts, while Goteam was a “request” by the Orebraid family.</a:t>
             </a:r>
           </a:p>
           <a:p>
@@ -4611,7 +3789,106 @@
                 <a:latin typeface="Arial" panose="020B0604020202020204" pitchFamily="34" charset="0"/>
                 <a:cs typeface="Arial" panose="020B0604020202020204" pitchFamily="34" charset="0"/>
               </a:rPr>
-              <a:t>The Four Brothers (Aer, Aqua, Ignis, and Terra) work together tirelessly to form all matter in the universe and are the only remaining unconscious titans. They reside in the Elemental Chaos in a quantum-like state, meaning that their exact locations are impossible to truly determine, such is their power. Originally the matter they produced was centered in an exact point, infinitely dense. This was until Ordo and Perditio got involved.</a:t>
+              <a:t>Urtonburg is split into 4 districts: </a:t>
+            </a:r>
+            <a:r>
+              <a:rPr lang="en-US" sz="1400" b="1" dirty="0">
+                <a:latin typeface="Arial" panose="020B0604020202020204" pitchFamily="34" charset="0"/>
+                <a:cs typeface="Arial" panose="020B0604020202020204" pitchFamily="34" charset="0"/>
+              </a:rPr>
+              <a:t>Weaver’s Crossing</a:t>
+            </a:r>
+            <a:r>
+              <a:rPr lang="en-US" sz="1400" dirty="0">
+                <a:latin typeface="Arial" panose="020B0604020202020204" pitchFamily="34" charset="0"/>
+                <a:cs typeface="Arial" panose="020B0604020202020204" pitchFamily="34" charset="0"/>
+              </a:rPr>
+              <a:t>, </a:t>
+            </a:r>
+            <a:r>
+              <a:rPr lang="en-US" sz="1400" b="1" dirty="0">
+                <a:latin typeface="Arial" panose="020B0604020202020204" pitchFamily="34" charset="0"/>
+                <a:cs typeface="Arial" panose="020B0604020202020204" pitchFamily="34" charset="0"/>
+              </a:rPr>
+              <a:t>Feysquare</a:t>
+            </a:r>
+            <a:r>
+              <a:rPr lang="en-US" sz="1400" dirty="0">
+                <a:latin typeface="Arial" panose="020B0604020202020204" pitchFamily="34" charset="0"/>
+                <a:cs typeface="Arial" panose="020B0604020202020204" pitchFamily="34" charset="0"/>
+              </a:rPr>
+              <a:t>, </a:t>
+            </a:r>
+            <a:r>
+              <a:rPr lang="en-US" sz="1400" b="1" dirty="0">
+                <a:latin typeface="Arial" panose="020B0604020202020204" pitchFamily="34" charset="0"/>
+                <a:cs typeface="Arial" panose="020B0604020202020204" pitchFamily="34" charset="0"/>
+              </a:rPr>
+              <a:t>Clayside</a:t>
+            </a:r>
+            <a:r>
+              <a:rPr lang="en-US" sz="1400" dirty="0">
+                <a:latin typeface="Arial" panose="020B0604020202020204" pitchFamily="34" charset="0"/>
+                <a:cs typeface="Arial" panose="020B0604020202020204" pitchFamily="34" charset="0"/>
+              </a:rPr>
+              <a:t>, and </a:t>
+            </a:r>
+            <a:r>
+              <a:rPr lang="en-US" sz="1400" b="1" dirty="0">
+                <a:latin typeface="Arial" panose="020B0604020202020204" pitchFamily="34" charset="0"/>
+                <a:cs typeface="Arial" panose="020B0604020202020204" pitchFamily="34" charset="0"/>
+              </a:rPr>
+              <a:t>Trade</a:t>
+            </a:r>
+            <a:r>
+              <a:rPr lang="en-US" sz="1400" dirty="0">
+                <a:latin typeface="Arial" panose="020B0604020202020204" pitchFamily="34" charset="0"/>
+                <a:cs typeface="Arial" panose="020B0604020202020204" pitchFamily="34" charset="0"/>
+              </a:rPr>
+              <a:t>. </a:t>
+            </a:r>
+          </a:p>
+          <a:p>
+            <a:pPr marL="0" indent="463550">
+              <a:lnSpc>
+                <a:spcPct val="150000"/>
+              </a:lnSpc>
+              <a:buNone/>
+            </a:pPr>
+            <a:r>
+              <a:rPr lang="en-US" sz="1400" dirty="0">
+                <a:latin typeface="Arial" panose="020B0604020202020204" pitchFamily="34" charset="0"/>
+                <a:cs typeface="Arial" panose="020B0604020202020204" pitchFamily="34" charset="0"/>
+              </a:rPr>
+              <a:t>The </a:t>
+            </a:r>
+            <a:r>
+              <a:rPr lang="en-US" sz="1400" b="1" dirty="0">
+                <a:latin typeface="Arial" panose="020B0604020202020204" pitchFamily="34" charset="0"/>
+                <a:cs typeface="Arial" panose="020B0604020202020204" pitchFamily="34" charset="0"/>
+              </a:rPr>
+              <a:t>Trade District</a:t>
+            </a:r>
+            <a:r>
+              <a:rPr lang="en-US" sz="1400" dirty="0">
+                <a:latin typeface="Arial" panose="020B0604020202020204" pitchFamily="34" charset="0"/>
+                <a:cs typeface="Arial" panose="020B0604020202020204" pitchFamily="34" charset="0"/>
+              </a:rPr>
+              <a:t> is the simplest of all, it is entirely made up of commercial buildings. Anything from basic magic shops to the finest blacksmiths in the land can be found here. While super convenient and easy to find, many of the shops raise their prices to quite an annoying degree at times. Other shops exist in other districts. There is also a really nice park here called the </a:t>
+            </a:r>
+            <a:r>
+              <a:rPr lang="en-US" sz="1400" b="1" dirty="0">
+                <a:latin typeface="Arial" panose="020B0604020202020204" pitchFamily="34" charset="0"/>
+                <a:cs typeface="Arial" panose="020B0604020202020204" pitchFamily="34" charset="0"/>
+              </a:rPr>
+              <a:t>Ganalow Gardens</a:t>
+            </a:r>
+            <a:r>
+              <a:rPr lang="en-US" sz="1400" dirty="0">
+                <a:latin typeface="Arial" panose="020B0604020202020204" pitchFamily="34" charset="0"/>
+                <a:cs typeface="Arial" panose="020B0604020202020204" pitchFamily="34" charset="0"/>
+              </a:rPr>
+              <a:t>.</a:t>
             </a:r>
           </a:p>
         </p:txBody>
@@ -4619,7 +3896,7 @@
     </p:spTree>
     <p:extLst>
       <p:ext uri="{BB962C8B-B14F-4D97-AF65-F5344CB8AC3E}">
-        <p14:creationId xmlns:p14="http://schemas.microsoft.com/office/powerpoint/2010/main" val="95418743"/>
+        <p14:creationId xmlns:p14="http://schemas.microsoft.com/office/powerpoint/2010/main" val="4636803"/>
       </p:ext>
     </p:extLst>
   </p:cSld>
@@ -4673,7 +3950,7 @@
               <a:rPr lang="en-US" sz="4400" dirty="0">
                 <a:latin typeface="Papyrus" panose="03070502060502030205" pitchFamily="66" charset="0"/>
               </a:rPr>
-              <a:t>The Titans (cont.)</a:t>
+              <a:t>Urtonburg (cont.)</a:t>
             </a:r>
           </a:p>
         </p:txBody>
@@ -4701,21 +3978,6 @@
           </a:bodyPr>
           <a:lstStyle/>
           <a:p>
-            <a:pPr marL="0" indent="0">
-              <a:lnSpc>
-                <a:spcPct val="150000"/>
-              </a:lnSpc>
-              <a:buNone/>
-            </a:pPr>
-            <a:r>
-              <a:rPr lang="en-US" sz="1400" b="1" i="1" dirty="0">
-                <a:latin typeface="Arial" panose="020B0604020202020204" pitchFamily="34" charset="0"/>
-                <a:cs typeface="Arial" panose="020B0604020202020204" pitchFamily="34" charset="0"/>
-              </a:rPr>
-              <a:t>The Manipulators:</a:t>
-            </a:r>
-          </a:p>
-          <a:p>
             <a:pPr marL="0" indent="463550">
               <a:lnSpc>
                 <a:spcPct val="150000"/>
@@ -4723,67 +3985,18 @@
               <a:buNone/>
             </a:pPr>
             <a:r>
+              <a:rPr lang="en-US" sz="1400" b="1" dirty="0">
+                <a:latin typeface="Arial" panose="020B0604020202020204" pitchFamily="34" charset="0"/>
+                <a:cs typeface="Arial" panose="020B0604020202020204" pitchFamily="34" charset="0"/>
+              </a:rPr>
+              <a:t>Weaver’s Crossing</a:t>
+            </a:r>
+            <a:r>
               <a:rPr lang="en-US" sz="1400" dirty="0">
                 <a:latin typeface="Arial" panose="020B0604020202020204" pitchFamily="34" charset="0"/>
                 <a:cs typeface="Arial" panose="020B0604020202020204" pitchFamily="34" charset="0"/>
               </a:rPr>
-              <a:t>The Manipulators (Ordo and Perditio) are the titans responsible for manipulating the matter of the universe. Ordo created and currently operates the Prismatorium, a plane-sized device that organizes all the matter in the universe into space in perfect uniformness. If left unchecked, Ordo would rip apart all matter into equally-spaced nodules, exactly 1ft. apart, throughout the entire universe. Luckily, his wife Perditio </a:t>
-            </a:r>
-            <a:r>
-              <a:rPr lang="en-US" sz="1400" i="1" dirty="0">
-                <a:latin typeface="Arial" panose="020B0604020202020204" pitchFamily="34" charset="0"/>
-                <a:cs typeface="Arial" panose="020B0604020202020204" pitchFamily="34" charset="0"/>
-              </a:rPr>
-              <a:t>does</a:t>
-            </a:r>
-            <a:r>
-              <a:rPr lang="en-US" sz="1400" dirty="0">
-                <a:latin typeface="Arial" panose="020B0604020202020204" pitchFamily="34" charset="0"/>
-                <a:cs typeface="Arial" panose="020B0604020202020204" pitchFamily="34" charset="0"/>
-              </a:rPr>
-              <a:t> keep him in check. She is responsible for chaos and all things ruled by chance. Her first action was The Poke, the first push that took Ordo’s uniform matter and allowed for it to clump up in uneven areas. She continues to poke several atoms of matter throughout the universe, causing quantum fluctuations and tunneling randomly. Were it not for this continual poking, one could know all secrets of the universe by only knowing the exact velocity of the first particle to be poked.</a:t>
-            </a:r>
-          </a:p>
-          <a:p>
-            <a:pPr marL="0" indent="463550">
-              <a:lnSpc>
-                <a:spcPct val="150000"/>
-              </a:lnSpc>
-              <a:buNone/>
-            </a:pPr>
-            <a:endParaRPr lang="en-US" sz="1400" dirty="0">
-              <a:latin typeface="Arial" panose="020B0604020202020204" pitchFamily="34" charset="0"/>
-              <a:cs typeface="Arial" panose="020B0604020202020204" pitchFamily="34" charset="0"/>
-            </a:endParaRPr>
-          </a:p>
-          <a:p>
-            <a:pPr marL="0" indent="0">
-              <a:lnSpc>
-                <a:spcPct val="150000"/>
-              </a:lnSpc>
-              <a:buNone/>
-            </a:pPr>
-            <a:r>
-              <a:rPr lang="en-US" sz="1400" b="1" i="1" dirty="0">
-                <a:latin typeface="Arial" panose="020B0604020202020204" pitchFamily="34" charset="0"/>
-                <a:cs typeface="Arial" panose="020B0604020202020204" pitchFamily="34" charset="0"/>
-              </a:rPr>
-              <a:t>Mystra:</a:t>
-            </a:r>
-          </a:p>
-          <a:p>
-            <a:pPr marL="0" indent="463550">
-              <a:lnSpc>
-                <a:spcPct val="150000"/>
-              </a:lnSpc>
-              <a:buNone/>
-            </a:pPr>
-            <a:r>
-              <a:rPr lang="en-US" sz="1400" dirty="0">
-                <a:latin typeface="Arial" panose="020B0604020202020204" pitchFamily="34" charset="0"/>
-                <a:cs typeface="Arial" panose="020B0604020202020204" pitchFamily="34" charset="0"/>
-              </a:rPr>
-              <a:t>Mystra is the Titan of Magic. She is responsible for the creation and control of all magic in the universe. She sources her magical energy from leftover matter created by the Four Brothers and runs it through the Weave. The Weave is an</a:t>
+              <a:t>, named after the late Damien Weaver, is the governing district. Here, all city-wide political decisions are made, the Nobles live there, and the royal guard have a station there. Much of Weaver’s Crossing is inaccessible to the public without invitation. Sneaking around there without the proper paperwork is fiercely punishable in court.</a:t>
             </a:r>
           </a:p>
         </p:txBody>
@@ -4791,7 +4004,7 @@
     </p:spTree>
     <p:extLst>
       <p:ext uri="{BB962C8B-B14F-4D97-AF65-F5344CB8AC3E}">
-        <p14:creationId xmlns:p14="http://schemas.microsoft.com/office/powerpoint/2010/main" val="4214306997"/>
+        <p14:creationId xmlns:p14="http://schemas.microsoft.com/office/powerpoint/2010/main" val="81130035"/>
       </p:ext>
     </p:extLst>
   </p:cSld>
@@ -4845,7 +4058,7 @@
               <a:rPr lang="en-US" sz="4400" dirty="0">
                 <a:latin typeface="Papyrus" panose="03070502060502030205" pitchFamily="66" charset="0"/>
               </a:rPr>
-              <a:t>The Titans (cont.)</a:t>
+              <a:t>Steelgulch</a:t>
             </a:r>
           </a:p>
         </p:txBody>
@@ -4873,7 +4086,7 @@
           </a:bodyPr>
           <a:lstStyle/>
           <a:p>
-            <a:pPr marL="0" indent="0">
+            <a:pPr marL="0" indent="463550">
               <a:lnSpc>
                 <a:spcPct val="150000"/>
               </a:lnSpc>
@@ -4884,49 +4097,7 @@
                 <a:latin typeface="Arial" panose="020B0604020202020204" pitchFamily="34" charset="0"/>
                 <a:cs typeface="Arial" panose="020B0604020202020204" pitchFamily="34" charset="0"/>
               </a:rPr>
-              <a:t>ever-running machine that controls magic and allows it to be usable all beings in the universe. Without the Weave, magic would intensely sear all matter it contacted. Mystra is the most mobile of the titans, as her magic allows her to instantly teleport anywhere in the universe, which she often does to avoid Gods pursuing direct access to the Weave. This fairly direct contact to other beings also makes Mystra the most-understood titan, which isn’t saying much as she is still barely understood throughout the universe.</a:t>
-            </a:r>
-          </a:p>
-          <a:p>
-            <a:pPr marL="0" indent="457200">
-              <a:lnSpc>
-                <a:spcPct val="150000"/>
-              </a:lnSpc>
-              <a:buNone/>
-            </a:pPr>
-            <a:endParaRPr lang="en-US" sz="1400" dirty="0">
-              <a:latin typeface="Arial" panose="020B0604020202020204" pitchFamily="34" charset="0"/>
-              <a:cs typeface="Arial" panose="020B0604020202020204" pitchFamily="34" charset="0"/>
-            </a:endParaRPr>
-          </a:p>
-          <a:p>
-            <a:pPr marL="0" indent="0">
-              <a:lnSpc>
-                <a:spcPct val="150000"/>
-              </a:lnSpc>
-              <a:buNone/>
-            </a:pPr>
-            <a:r>
-              <a:rPr lang="en-US" sz="1400" b="1" i="1" dirty="0">
-                <a:latin typeface="Arial" panose="020B0604020202020204" pitchFamily="34" charset="0"/>
-                <a:cs typeface="Arial" panose="020B0604020202020204" pitchFamily="34" charset="0"/>
-              </a:rPr>
-              <a:t>Chronos:</a:t>
-            </a:r>
-          </a:p>
-          <a:p>
-            <a:pPr marL="0" indent="457200">
-              <a:lnSpc>
-                <a:spcPct val="150000"/>
-              </a:lnSpc>
-              <a:buNone/>
-            </a:pPr>
-            <a:r>
-              <a:rPr lang="en-US" sz="1400" dirty="0">
-                <a:latin typeface="Arial" panose="020B0604020202020204" pitchFamily="34" charset="0"/>
-                <a:cs typeface="Arial" panose="020B0604020202020204" pitchFamily="34" charset="0"/>
-              </a:rPr>
-              <a:t>The last of titans is Chronos, the master of time. Chronos, obviously, is responsible for the flow of time throughout the entire universe. He does this through his device called the Chronosphere. Of all the conscious titans, Chronos is the most devoted to his job. He was the first to suggest making the Gods as he very much desired to improve his Chronosphere by enlisting the help of other less-busy beings.</a:t>
+              <a:t>Small mining town near Dhordarum. Literally only exists because I loved the name.</a:t>
             </a:r>
           </a:p>
         </p:txBody>
@@ -4934,7 +4105,7 @@
     </p:spTree>
     <p:extLst>
       <p:ext uri="{BB962C8B-B14F-4D97-AF65-F5344CB8AC3E}">
-        <p14:creationId xmlns:p14="http://schemas.microsoft.com/office/powerpoint/2010/main" val="2174104249"/>
+        <p14:creationId xmlns:p14="http://schemas.microsoft.com/office/powerpoint/2010/main" val="14720125"/>
       </p:ext>
     </p:extLst>
   </p:cSld>

</xml_diff>

<commit_message>
Did a little more work on Urtonburg.
</commit_message>
<xml_diff>
--- a/The Jaws of Time.pptx
+++ b/The Jaws of Time.pptx
@@ -251,7 +251,7 @@
           <a:p>
             <a:fld id="{05FE7FBA-F4D8-4820-972B-6B84E9A3DAEA}" type="datetimeFigureOut">
               <a:rPr lang="en-US" smtClean="0"/>
-              <a:t>5/5/2021</a:t>
+              <a:t>5/6/2021</a:t>
             </a:fld>
             <a:endParaRPr lang="en-US"/>
           </a:p>
@@ -421,7 +421,7 @@
           <a:p>
             <a:fld id="{05FE7FBA-F4D8-4820-972B-6B84E9A3DAEA}" type="datetimeFigureOut">
               <a:rPr lang="en-US" smtClean="0"/>
-              <a:t>5/5/2021</a:t>
+              <a:t>5/6/2021</a:t>
             </a:fld>
             <a:endParaRPr lang="en-US"/>
           </a:p>
@@ -601,7 +601,7 @@
           <a:p>
             <a:fld id="{05FE7FBA-F4D8-4820-972B-6B84E9A3DAEA}" type="datetimeFigureOut">
               <a:rPr lang="en-US" smtClean="0"/>
-              <a:t>5/5/2021</a:t>
+              <a:t>5/6/2021</a:t>
             </a:fld>
             <a:endParaRPr lang="en-US"/>
           </a:p>
@@ -771,7 +771,7 @@
           <a:p>
             <a:fld id="{05FE7FBA-F4D8-4820-972B-6B84E9A3DAEA}" type="datetimeFigureOut">
               <a:rPr lang="en-US" smtClean="0"/>
-              <a:t>5/5/2021</a:t>
+              <a:t>5/6/2021</a:t>
             </a:fld>
             <a:endParaRPr lang="en-US"/>
           </a:p>
@@ -1015,7 +1015,7 @@
           <a:p>
             <a:fld id="{05FE7FBA-F4D8-4820-972B-6B84E9A3DAEA}" type="datetimeFigureOut">
               <a:rPr lang="en-US" smtClean="0"/>
-              <a:t>5/5/2021</a:t>
+              <a:t>5/6/2021</a:t>
             </a:fld>
             <a:endParaRPr lang="en-US"/>
           </a:p>
@@ -1247,7 +1247,7 @@
           <a:p>
             <a:fld id="{05FE7FBA-F4D8-4820-972B-6B84E9A3DAEA}" type="datetimeFigureOut">
               <a:rPr lang="en-US" smtClean="0"/>
-              <a:t>5/5/2021</a:t>
+              <a:t>5/6/2021</a:t>
             </a:fld>
             <a:endParaRPr lang="en-US"/>
           </a:p>
@@ -1614,7 +1614,7 @@
           <a:p>
             <a:fld id="{05FE7FBA-F4D8-4820-972B-6B84E9A3DAEA}" type="datetimeFigureOut">
               <a:rPr lang="en-US" smtClean="0"/>
-              <a:t>5/5/2021</a:t>
+              <a:t>5/6/2021</a:t>
             </a:fld>
             <a:endParaRPr lang="en-US"/>
           </a:p>
@@ -1732,7 +1732,7 @@
           <a:p>
             <a:fld id="{05FE7FBA-F4D8-4820-972B-6B84E9A3DAEA}" type="datetimeFigureOut">
               <a:rPr lang="en-US" smtClean="0"/>
-              <a:t>5/5/2021</a:t>
+              <a:t>5/6/2021</a:t>
             </a:fld>
             <a:endParaRPr lang="en-US"/>
           </a:p>
@@ -1827,7 +1827,7 @@
           <a:p>
             <a:fld id="{05FE7FBA-F4D8-4820-972B-6B84E9A3DAEA}" type="datetimeFigureOut">
               <a:rPr lang="en-US" smtClean="0"/>
-              <a:t>5/5/2021</a:t>
+              <a:t>5/6/2021</a:t>
             </a:fld>
             <a:endParaRPr lang="en-US"/>
           </a:p>
@@ -2104,7 +2104,7 @@
           <a:p>
             <a:fld id="{05FE7FBA-F4D8-4820-972B-6B84E9A3DAEA}" type="datetimeFigureOut">
               <a:rPr lang="en-US" smtClean="0"/>
-              <a:t>5/5/2021</a:t>
+              <a:t>5/6/2021</a:t>
             </a:fld>
             <a:endParaRPr lang="en-US"/>
           </a:p>
@@ -2360,7 +2360,7 @@
           <a:p>
             <a:fld id="{05FE7FBA-F4D8-4820-972B-6B84E9A3DAEA}" type="datetimeFigureOut">
               <a:rPr lang="en-US" smtClean="0"/>
-              <a:t>5/5/2021</a:t>
+              <a:t>5/6/2021</a:t>
             </a:fld>
             <a:endParaRPr lang="en-US"/>
           </a:p>
@@ -2578,7 +2578,7 @@
           <a:p>
             <a:fld id="{05FE7FBA-F4D8-4820-972B-6B84E9A3DAEA}" type="datetimeFigureOut">
               <a:rPr lang="en-US" smtClean="0"/>
-              <a:t>5/5/2021</a:t>
+              <a:t>5/6/2021</a:t>
             </a:fld>
             <a:endParaRPr lang="en-US"/>
           </a:p>
@@ -3356,7 +3356,7 @@
           <a:lstStyle/>
           <a:p>
             <a:r>
-              <a:rPr lang="en-US">
+              <a:rPr lang="en-US" dirty="0">
                 <a:latin typeface="Arial" panose="020B0604020202020204" pitchFamily="34" charset="0"/>
                 <a:cs typeface="Arial" panose="020B0604020202020204" pitchFamily="34" charset="0"/>
               </a:rPr>
@@ -3996,8 +3996,56 @@
                 <a:latin typeface="Arial" panose="020B0604020202020204" pitchFamily="34" charset="0"/>
                 <a:cs typeface="Arial" panose="020B0604020202020204" pitchFamily="34" charset="0"/>
               </a:rPr>
-              <a:t>, named after the late Damien Weaver, is the governing district. Here, all city-wide political decisions are made, the Nobles live there, and the royal guard have a station there. Much of Weaver’s Crossing is inaccessible to the public without invitation. Sneaking around there without the proper paperwork is fiercely punishable in court.</a:t>
-            </a:r>
+              <a:t>, named after the late Damien Weaver, is the governing district. Here, all city-wide political decisions are made, the Nobles live there, and the royal guard have a station there. Much of Weaver’s Crossing is inaccessible to the public without invitation. Sneaking around there without the proper paperwork is fiercely punishable in court; death in extreme cases.</a:t>
+            </a:r>
+          </a:p>
+          <a:p>
+            <a:pPr marL="0" indent="463550">
+              <a:lnSpc>
+                <a:spcPct val="150000"/>
+              </a:lnSpc>
+              <a:buNone/>
+            </a:pPr>
+            <a:r>
+              <a:rPr lang="en-US" sz="1400" b="1" dirty="0">
+                <a:latin typeface="Arial" panose="020B0604020202020204" pitchFamily="34" charset="0"/>
+                <a:cs typeface="Arial" panose="020B0604020202020204" pitchFamily="34" charset="0"/>
+              </a:rPr>
+              <a:t>Feysquare</a:t>
+            </a:r>
+            <a:r>
+              <a:rPr lang="en-US" sz="1400" dirty="0">
+                <a:latin typeface="Arial" panose="020B0604020202020204" pitchFamily="34" charset="0"/>
+                <a:cs typeface="Arial" panose="020B0604020202020204" pitchFamily="34" charset="0"/>
+              </a:rPr>
+              <a:t> is home to the elf population in Urtonburg, with a strict border on South St. On average, Feysquare is a bit more cramped than the rest of the city; most housing is rented and only a few feet apart. Fires would be common weren’t it for the tendency of elves to be more magical. There is a decent mix of high elf and wood elf present, both making up roughly 50% of the elf population. The shops here are almost entirely magic and wineries.</a:t>
+            </a:r>
+          </a:p>
+          <a:p>
+            <a:pPr marL="0" indent="463550">
+              <a:lnSpc>
+                <a:spcPct val="150000"/>
+              </a:lnSpc>
+              <a:buNone/>
+            </a:pPr>
+            <a:r>
+              <a:rPr lang="en-US" sz="1400" b="1" dirty="0">
+                <a:latin typeface="Arial" panose="020B0604020202020204" pitchFamily="34" charset="0"/>
+                <a:cs typeface="Arial" panose="020B0604020202020204" pitchFamily="34" charset="0"/>
+              </a:rPr>
+              <a:t>Clayside</a:t>
+            </a:r>
+            <a:r>
+              <a:rPr lang="en-US" sz="1400" dirty="0">
+                <a:latin typeface="Arial" panose="020B0604020202020204" pitchFamily="34" charset="0"/>
+                <a:cs typeface="Arial" panose="020B0604020202020204" pitchFamily="34" charset="0"/>
+              </a:rPr>
+              <a:t> is the dwarvern district of Urtonburg, also strictly bordered with South St. Clayside is mostly a residential area, but there is a decent amount of front business for the Orebraid Steel company. That is to say there are plenty of blacksmiths and offices in the area. The more lively taverns tend to be here. Clayside is home to the stadium</a:t>
+            </a:r>
+            <a:endParaRPr lang="en-US" sz="1400" b="1" dirty="0">
+              <a:latin typeface="Arial" panose="020B0604020202020204" pitchFamily="34" charset="0"/>
+              <a:cs typeface="Arial" panose="020B0604020202020204" pitchFamily="34" charset="0"/>
+            </a:endParaRPr>
           </a:p>
         </p:txBody>
       </p:sp>

</xml_diff>